<commit_message>
update link, add def, adds OLS summary report
</commit_message>
<xml_diff>
--- a/Steam_Final_Project.pptx
+++ b/Steam_Final_Project.pptx
@@ -212,7 +212,7 @@
           <a:p>
             <a:fld id="{0899C1D7-0031-1541-AA63-7FAEC1216BBD}" type="datetimeFigureOut">
               <a:rPr lang="en-US" smtClean="0"/>
-              <a:t>2/25/2023</a:t>
+              <a:t>2/26/2023</a:t>
             </a:fld>
             <a:endParaRPr lang="en-US"/>
           </a:p>
@@ -7169,7 +7169,7 @@
           <a:p>
             <a:fld id="{D386965C-165C-764D-B490-A5796C92088F}" type="datetimeFigureOut">
               <a:rPr lang="en-US" smtClean="0"/>
-              <a:t>2/25/2023</a:t>
+              <a:t>2/26/2023</a:t>
             </a:fld>
             <a:endParaRPr lang="en-US"/>
           </a:p>
@@ -9055,7 +9055,7 @@
         </p:spPr>
         <p:txBody>
           <a:bodyPr vert="horz" lIns="91440" tIns="45720" rIns="91440" bIns="45720" rtlCol="0">
-            <a:normAutofit lnSpcReduction="10000"/>
+            <a:normAutofit/>
           </a:bodyPr>
           <a:lstStyle>
             <a:lvl1pPr marL="228600" indent="-228600" algn="l" defTabSz="914400" rtl="0" eaLnBrk="1" latinLnBrk="0" hangingPunct="1">
@@ -9235,8 +9235,29 @@
                 <a:ea typeface="Verdana" panose="020B0604030504040204" pitchFamily="34" charset="0"/>
                 <a:cs typeface="Times New Roman" panose="02020603050405020304" pitchFamily="18" charset="0"/>
               </a:rPr>
-              <a:t>Adding a structural decision based on data analysis of similar cases rather than picking something that seems good or would make the most profits in a short amount of time.</a:t>
-            </a:r>
+              <a:t>Adding a structural decision based on data analysis of similar cases helps game developers improve </a:t>
+            </a:r>
+            <a:r>
+              <a:rPr lang="en-US">
+                <a:solidFill>
+                  <a:schemeClr val="tx2"/>
+                </a:solidFill>
+                <a:effectLst/>
+                <a:latin typeface="Verdana" panose="020B0604030504040204" pitchFamily="34" charset="0"/>
+                <a:ea typeface="Verdana" panose="020B0604030504040204" pitchFamily="34" charset="0"/>
+                <a:cs typeface="Times New Roman" panose="02020603050405020304" pitchFamily="18" charset="0"/>
+              </a:rPr>
+              <a:t>sales strategies.</a:t>
+            </a:r>
+            <a:endParaRPr lang="en-US" dirty="0">
+              <a:solidFill>
+                <a:schemeClr val="tx2"/>
+              </a:solidFill>
+              <a:effectLst/>
+              <a:latin typeface="Verdana" panose="020B0604030504040204" pitchFamily="34" charset="0"/>
+              <a:ea typeface="Verdana" panose="020B0604030504040204" pitchFamily="34" charset="0"/>
+              <a:cs typeface="Times New Roman" panose="02020603050405020304" pitchFamily="18" charset="0"/>
+            </a:endParaRPr>
           </a:p>
           <a:p>
             <a:pPr marL="0" indent="0">

</xml_diff>

<commit_message>
update pwt, adds final predictions
</commit_message>
<xml_diff>
--- a/Steam_Final_Project.pptx
+++ b/Steam_Final_Project.pptx
@@ -5,7 +5,7 @@
     <p:sldMasterId id="2147483648" r:id="rId1"/>
   </p:sldMasterIdLst>
   <p:notesMasterIdLst>
-    <p:notesMasterId r:id="rId18"/>
+    <p:notesMasterId r:id="rId21"/>
   </p:notesMasterIdLst>
   <p:sldIdLst>
     <p:sldId id="258" r:id="rId2"/>
@@ -18,12 +18,15 @@
     <p:sldId id="266" r:id="rId9"/>
     <p:sldId id="274" r:id="rId10"/>
     <p:sldId id="267" r:id="rId11"/>
-    <p:sldId id="268" r:id="rId12"/>
-    <p:sldId id="269" r:id="rId13"/>
-    <p:sldId id="276" r:id="rId14"/>
-    <p:sldId id="277" r:id="rId15"/>
-    <p:sldId id="259" r:id="rId16"/>
-    <p:sldId id="278" r:id="rId17"/>
+    <p:sldId id="281" r:id="rId12"/>
+    <p:sldId id="268" r:id="rId13"/>
+    <p:sldId id="269" r:id="rId14"/>
+    <p:sldId id="276" r:id="rId15"/>
+    <p:sldId id="277" r:id="rId16"/>
+    <p:sldId id="279" r:id="rId17"/>
+    <p:sldId id="280" r:id="rId18"/>
+    <p:sldId id="259" r:id="rId19"/>
+    <p:sldId id="278" r:id="rId20"/>
   </p:sldIdLst>
   <p:sldSz cx="12192000" cy="6858000"/>
   <p:notesSz cx="6858000" cy="9144000"/>
@@ -212,7 +215,7 @@
           <a:p>
             <a:fld id="{0899C1D7-0031-1541-AA63-7FAEC1216BBD}" type="datetimeFigureOut">
               <a:rPr lang="en-US" smtClean="0"/>
-              <a:t>2/26/2023</a:t>
+              <a:t>3/9/2023</a:t>
             </a:fld>
             <a:endParaRPr lang="en-US"/>
           </a:p>
@@ -7169,7 +7172,7 @@
           <a:p>
             <a:fld id="{D386965C-165C-764D-B490-A5796C92088F}" type="datetimeFigureOut">
               <a:rPr lang="en-US" smtClean="0"/>
-              <a:t>2/26/2023</a:t>
+              <a:t>3/9/2023</a:t>
             </a:fld>
             <a:endParaRPr lang="en-US"/>
           </a:p>
@@ -8036,7 +8039,7 @@
           <p:cNvPr id="2" name="Title 1">
             <a:extLst>
               <a:ext uri="{FF2B5EF4-FFF2-40B4-BE49-F238E27FC236}">
-                <a16:creationId xmlns:a16="http://schemas.microsoft.com/office/drawing/2014/main" id="{7ACA722E-133A-C14E-B940-93B32C189F31}"/>
+                <a16:creationId xmlns:a16="http://schemas.microsoft.com/office/drawing/2014/main" id="{F0EFF0AC-7669-E686-A1CF-94D0DAE4911B}"/>
               </a:ext>
             </a:extLst>
           </p:cNvPr>
@@ -8054,57 +8057,45 @@
           <a:p>
             <a:r>
               <a:rPr lang="en-US" dirty="0"/>
-              <a:t>Data Splitting</a:t>
+              <a:t>Target Distribution </a:t>
             </a:r>
           </a:p>
         </p:txBody>
       </p:sp>
-      <p:sp>
-        <p:nvSpPr>
-          <p:cNvPr id="4" name="Text Placeholder 3">
-            <a:extLst>
-              <a:ext uri="{FF2B5EF4-FFF2-40B4-BE49-F238E27FC236}">
-                <a16:creationId xmlns:a16="http://schemas.microsoft.com/office/drawing/2014/main" id="{B93B651B-D999-344A-B24B-EB2EE32D3ADA}"/>
-              </a:ext>
-            </a:extLst>
-          </p:cNvPr>
-          <p:cNvSpPr>
-            <a:spLocks noGrp="1"/>
-          </p:cNvSpPr>
-          <p:nvPr>
-            <p:ph type="body" idx="10"/>
-          </p:nvPr>
-        </p:nvSpPr>
-        <p:spPr>
-          <a:xfrm>
-            <a:off x="1095270" y="2070938"/>
-            <a:ext cx="10132259" cy="4079696"/>
-          </a:xfrm>
-        </p:spPr>
-        <p:txBody>
-          <a:bodyPr/>
-          <a:lstStyle/>
-          <a:p>
-            <a:r>
-              <a:rPr lang="en-US" dirty="0">
-                <a:solidFill>
-                  <a:schemeClr val="tx2"/>
-                </a:solidFill>
-                <a:latin typeface="Verdana" panose="020B0604030504040204" pitchFamily="34" charset="0"/>
-                <a:ea typeface="Verdana" panose="020B0604030504040204" pitchFamily="34" charset="0"/>
-              </a:rPr>
-              <a:t>We used a split of 80/20 with 80% in training and 20% in test. </a:t>
-            </a:r>
-          </a:p>
-          <a:p>
-            <a:endParaRPr lang="en-US" dirty="0"/>
-          </a:p>
-        </p:txBody>
-      </p:sp>
+      <p:pic>
+        <p:nvPicPr>
+          <p:cNvPr id="6" name="Picture 5" descr="Chart, histogram&#10;&#10;Description automatically generated">
+            <a:extLst>
+              <a:ext uri="{FF2B5EF4-FFF2-40B4-BE49-F238E27FC236}">
+                <a16:creationId xmlns:a16="http://schemas.microsoft.com/office/drawing/2014/main" id="{F197787B-6084-D68F-83AF-B5262648BC62}"/>
+              </a:ext>
+            </a:extLst>
+          </p:cNvPr>
+          <p:cNvPicPr>
+            <a:picLocks noChangeAspect="1"/>
+          </p:cNvPicPr>
+          <p:nvPr/>
+        </p:nvPicPr>
+        <p:blipFill>
+          <a:blip r:embed="rId2"/>
+          <a:stretch>
+            <a:fillRect/>
+          </a:stretch>
+        </p:blipFill>
+        <p:spPr>
+          <a:xfrm>
+            <a:off x="3004704" y="1795190"/>
+            <a:ext cx="6182591" cy="4779351"/>
+          </a:xfrm>
+          <a:prstGeom prst="rect">
+            <a:avLst/>
+          </a:prstGeom>
+        </p:spPr>
+      </p:pic>
     </p:spTree>
     <p:extLst>
       <p:ext uri="{BB962C8B-B14F-4D97-AF65-F5344CB8AC3E}">
-        <p14:creationId xmlns:p14="http://schemas.microsoft.com/office/powerpoint/2010/main" val="3559523306"/>
+        <p14:creationId xmlns:p14="http://schemas.microsoft.com/office/powerpoint/2010/main" val="4129230502"/>
       </p:ext>
     </p:extLst>
   </p:cSld>
@@ -8136,7 +8127,7 @@
           <p:cNvPr id="2" name="Title 1">
             <a:extLst>
               <a:ext uri="{FF2B5EF4-FFF2-40B4-BE49-F238E27FC236}">
-                <a16:creationId xmlns:a16="http://schemas.microsoft.com/office/drawing/2014/main" id="{73651502-26B8-2141-A3C9-CD6BEAF631CE}"/>
+                <a16:creationId xmlns:a16="http://schemas.microsoft.com/office/drawing/2014/main" id="{7ACA722E-133A-C14E-B940-93B32C189F31}"/>
               </a:ext>
             </a:extLst>
           </p:cNvPr>
@@ -8154,7 +8145,7 @@
           <a:p>
             <a:r>
               <a:rPr lang="en-US" dirty="0"/>
-              <a:t>Model Building</a:t>
+              <a:t>Data Splitting</a:t>
             </a:r>
           </a:p>
         </p:txBody>
@@ -8164,7 +8155,7 @@
           <p:cNvPr id="4" name="Text Placeholder 3">
             <a:extLst>
               <a:ext uri="{FF2B5EF4-FFF2-40B4-BE49-F238E27FC236}">
-                <a16:creationId xmlns:a16="http://schemas.microsoft.com/office/drawing/2014/main" id="{3BEB3040-D840-FC42-B798-7B8DCCFEDCA2}"/>
+                <a16:creationId xmlns:a16="http://schemas.microsoft.com/office/drawing/2014/main" id="{B93B651B-D999-344A-B24B-EB2EE32D3ADA}"/>
               </a:ext>
             </a:extLst>
           </p:cNvPr>
@@ -8175,27 +8166,82 @@
             <p:ph type="body" idx="10"/>
           </p:nvPr>
         </p:nvSpPr>
-        <p:spPr/>
+        <p:spPr>
+          <a:xfrm>
+            <a:off x="1095270" y="2070938"/>
+            <a:ext cx="10132259" cy="4079696"/>
+          </a:xfrm>
+        </p:spPr>
         <p:txBody>
           <a:bodyPr/>
           <a:lstStyle/>
           <a:p>
             <a:r>
-              <a:rPr lang="en-US" dirty="0"/>
-              <a:t>Insert screenshot or code </a:t>
-            </a:r>
-            <a:r>
-              <a:rPr lang="en-US" dirty="0" err="1"/>
-              <a:t>snippit</a:t>
-            </a:r>
-            <a:endParaRPr lang="en-US" dirty="0"/>
+              <a:rPr lang="en-US" dirty="0">
+                <a:solidFill>
+                  <a:schemeClr val="tx2"/>
+                </a:solidFill>
+                <a:ea typeface="Verdana" panose="020B0604030504040204" pitchFamily="34" charset="0"/>
+              </a:rPr>
+              <a:t>We used a split of 80/20 with 80% in training and 20% in test. </a:t>
+            </a:r>
+          </a:p>
+          <a:p>
+            <a:r>
+              <a:rPr lang="en-US" dirty="0">
+                <a:solidFill>
+                  <a:schemeClr val="tx2"/>
+                </a:solidFill>
+              </a:rPr>
+              <a:t>(331, 3)</a:t>
+            </a:r>
+          </a:p>
+          <a:p>
+            <a:r>
+              <a:rPr lang="en-US" dirty="0">
+                <a:solidFill>
+                  <a:schemeClr val="tx2"/>
+                </a:solidFill>
+              </a:rPr>
+              <a:t>(83, 3)</a:t>
+            </a:r>
+          </a:p>
+          <a:p>
+            <a:r>
+              <a:rPr lang="en-US" dirty="0">
+                <a:solidFill>
+                  <a:schemeClr val="tx2"/>
+                </a:solidFill>
+              </a:rPr>
+              <a:t>(331,)</a:t>
+            </a:r>
+          </a:p>
+          <a:p>
+            <a:r>
+              <a:rPr lang="en-US" dirty="0">
+                <a:solidFill>
+                  <a:schemeClr val="tx2"/>
+                </a:solidFill>
+              </a:rPr>
+              <a:t>(83,)</a:t>
+            </a:r>
+          </a:p>
+          <a:p>
+            <a:r>
+              <a:rPr lang="en-US" dirty="0">
+                <a:solidFill>
+                  <a:schemeClr val="tx2"/>
+                </a:solidFill>
+              </a:rPr>
+              <a:t>After all of the data cleaning we ended with 414 observations and 3 columns.</a:t>
+            </a:r>
           </a:p>
         </p:txBody>
       </p:sp>
     </p:spTree>
     <p:extLst>
       <p:ext uri="{BB962C8B-B14F-4D97-AF65-F5344CB8AC3E}">
-        <p14:creationId xmlns:p14="http://schemas.microsoft.com/office/powerpoint/2010/main" val="24590043"/>
+        <p14:creationId xmlns:p14="http://schemas.microsoft.com/office/powerpoint/2010/main" val="3559523306"/>
       </p:ext>
     </p:extLst>
   </p:cSld>
@@ -8227,7 +8273,7 @@
           <p:cNvPr id="2" name="Title 1">
             <a:extLst>
               <a:ext uri="{FF2B5EF4-FFF2-40B4-BE49-F238E27FC236}">
-                <a16:creationId xmlns:a16="http://schemas.microsoft.com/office/drawing/2014/main" id="{26FDDC57-92EA-63A4-B5F6-C8C537672845}"/>
+                <a16:creationId xmlns:a16="http://schemas.microsoft.com/office/drawing/2014/main" id="{73651502-26B8-2141-A3C9-CD6BEAF631CE}"/>
               </a:ext>
             </a:extLst>
           </p:cNvPr>
@@ -8245,65 +8291,75 @@
           <a:p>
             <a:r>
               <a:rPr lang="en-US" dirty="0"/>
-              <a:t>Model Selection</a:t>
+              <a:t>Model Building</a:t>
             </a:r>
           </a:p>
         </p:txBody>
       </p:sp>
-      <p:sp>
-        <p:nvSpPr>
-          <p:cNvPr id="3" name="Text Placeholder 2">
-            <a:extLst>
-              <a:ext uri="{FF2B5EF4-FFF2-40B4-BE49-F238E27FC236}">
-                <a16:creationId xmlns:a16="http://schemas.microsoft.com/office/drawing/2014/main" id="{A8760E59-A51A-1F3A-D3D7-F44CAA1D003C}"/>
-              </a:ext>
-            </a:extLst>
-          </p:cNvPr>
-          <p:cNvSpPr>
-            <a:spLocks noGrp="1"/>
-          </p:cNvSpPr>
-          <p:nvPr>
-            <p:ph type="body" idx="1"/>
-          </p:nvPr>
-        </p:nvSpPr>
-        <p:spPr/>
-        <p:txBody>
-          <a:bodyPr/>
-          <a:lstStyle/>
-          <a:p>
-            <a:endParaRPr lang="en-US"/>
-          </a:p>
-        </p:txBody>
-      </p:sp>
-      <p:sp>
-        <p:nvSpPr>
-          <p:cNvPr id="4" name="Text Placeholder 3">
-            <a:extLst>
-              <a:ext uri="{FF2B5EF4-FFF2-40B4-BE49-F238E27FC236}">
-                <a16:creationId xmlns:a16="http://schemas.microsoft.com/office/drawing/2014/main" id="{121BDA51-D86B-B746-C6D7-78FF4A59BC18}"/>
-              </a:ext>
-            </a:extLst>
-          </p:cNvPr>
-          <p:cNvSpPr>
-            <a:spLocks noGrp="1"/>
-          </p:cNvSpPr>
-          <p:nvPr>
-            <p:ph type="body" idx="10"/>
-          </p:nvPr>
-        </p:nvSpPr>
-        <p:spPr/>
-        <p:txBody>
-          <a:bodyPr/>
-          <a:lstStyle/>
-          <a:p>
-            <a:endParaRPr lang="en-US"/>
-          </a:p>
-        </p:txBody>
-      </p:sp>
+      <p:pic>
+        <p:nvPicPr>
+          <p:cNvPr id="5" name="Picture 4" descr="Text&#10;&#10;Description automatically generated">
+            <a:extLst>
+              <a:ext uri="{FF2B5EF4-FFF2-40B4-BE49-F238E27FC236}">
+                <a16:creationId xmlns:a16="http://schemas.microsoft.com/office/drawing/2014/main" id="{1A0FD5F5-25BA-719A-C8C4-A67A2BB441DD}"/>
+              </a:ext>
+            </a:extLst>
+          </p:cNvPr>
+          <p:cNvPicPr>
+            <a:picLocks noChangeAspect="1"/>
+          </p:cNvPicPr>
+          <p:nvPr/>
+        </p:nvPicPr>
+        <p:blipFill>
+          <a:blip r:embed="rId2"/>
+          <a:stretch>
+            <a:fillRect/>
+          </a:stretch>
+        </p:blipFill>
+        <p:spPr>
+          <a:xfrm>
+            <a:off x="147930" y="1778557"/>
+            <a:ext cx="5888788" cy="3725419"/>
+          </a:xfrm>
+          <a:prstGeom prst="rect">
+            <a:avLst/>
+          </a:prstGeom>
+        </p:spPr>
+      </p:pic>
+      <p:pic>
+        <p:nvPicPr>
+          <p:cNvPr id="7" name="Picture 6" descr="Text&#10;&#10;Description automatically generated">
+            <a:extLst>
+              <a:ext uri="{FF2B5EF4-FFF2-40B4-BE49-F238E27FC236}">
+                <a16:creationId xmlns:a16="http://schemas.microsoft.com/office/drawing/2014/main" id="{ED47A634-6C16-8EDA-0B78-F3D39FDFB717}"/>
+              </a:ext>
+            </a:extLst>
+          </p:cNvPr>
+          <p:cNvPicPr>
+            <a:picLocks noChangeAspect="1"/>
+          </p:cNvPicPr>
+          <p:nvPr/>
+        </p:nvPicPr>
+        <p:blipFill>
+          <a:blip r:embed="rId3"/>
+          <a:stretch>
+            <a:fillRect/>
+          </a:stretch>
+        </p:blipFill>
+        <p:spPr>
+          <a:xfrm>
+            <a:off x="6096000" y="1979711"/>
+            <a:ext cx="6022312" cy="2066410"/>
+          </a:xfrm>
+          <a:prstGeom prst="rect">
+            <a:avLst/>
+          </a:prstGeom>
+        </p:spPr>
+      </p:pic>
     </p:spTree>
     <p:extLst>
       <p:ext uri="{BB962C8B-B14F-4D97-AF65-F5344CB8AC3E}">
-        <p14:creationId xmlns:p14="http://schemas.microsoft.com/office/powerpoint/2010/main" val="2774683180"/>
+        <p14:creationId xmlns:p14="http://schemas.microsoft.com/office/powerpoint/2010/main" val="24590043"/>
       </p:ext>
     </p:extLst>
   </p:cSld>
@@ -8335,7 +8391,7 @@
           <p:cNvPr id="2" name="Title 1">
             <a:extLst>
               <a:ext uri="{FF2B5EF4-FFF2-40B4-BE49-F238E27FC236}">
-                <a16:creationId xmlns:a16="http://schemas.microsoft.com/office/drawing/2014/main" id="{9C39E3C3-06F2-6BC9-53D0-0EBD963C8322}"/>
+                <a16:creationId xmlns:a16="http://schemas.microsoft.com/office/drawing/2014/main" id="{26FDDC57-92EA-63A4-B5F6-C8C537672845}"/>
               </a:ext>
             </a:extLst>
           </p:cNvPr>
@@ -8353,33 +8409,8 @@
           <a:p>
             <a:r>
               <a:rPr lang="en-US" dirty="0"/>
-              <a:t>Model Evaluation</a:t>
-            </a:r>
-          </a:p>
-        </p:txBody>
-      </p:sp>
-      <p:sp>
-        <p:nvSpPr>
-          <p:cNvPr id="3" name="Text Placeholder 2">
-            <a:extLst>
-              <a:ext uri="{FF2B5EF4-FFF2-40B4-BE49-F238E27FC236}">
-                <a16:creationId xmlns:a16="http://schemas.microsoft.com/office/drawing/2014/main" id="{86B2C17C-157D-925B-4B7F-BD707C848C2F}"/>
-              </a:ext>
-            </a:extLst>
-          </p:cNvPr>
-          <p:cNvSpPr>
-            <a:spLocks noGrp="1"/>
-          </p:cNvSpPr>
-          <p:nvPr>
-            <p:ph type="body" idx="1"/>
-          </p:nvPr>
-        </p:nvSpPr>
-        <p:spPr/>
-        <p:txBody>
-          <a:bodyPr/>
-          <a:lstStyle/>
-          <a:p>
-            <a:endParaRPr lang="en-US"/>
+              <a:t>Model Selection</a:t>
+            </a:r>
           </a:p>
         </p:txBody>
       </p:sp>
@@ -8388,7 +8419,7 @@
           <p:cNvPr id="4" name="Text Placeholder 3">
             <a:extLst>
               <a:ext uri="{FF2B5EF4-FFF2-40B4-BE49-F238E27FC236}">
-                <a16:creationId xmlns:a16="http://schemas.microsoft.com/office/drawing/2014/main" id="{7FEBB9E5-8B5F-2268-93FD-56EEEE914340}"/>
+                <a16:creationId xmlns:a16="http://schemas.microsoft.com/office/drawing/2014/main" id="{121BDA51-D86B-B746-C6D7-78FF4A59BC18}"/>
               </a:ext>
             </a:extLst>
           </p:cNvPr>
@@ -8399,19 +8430,61 @@
             <p:ph type="body" idx="10"/>
           </p:nvPr>
         </p:nvSpPr>
-        <p:spPr/>
+        <p:spPr>
+          <a:xfrm>
+            <a:off x="711929" y="2070938"/>
+            <a:ext cx="6452329" cy="1888113"/>
+          </a:xfrm>
+        </p:spPr>
         <p:txBody>
           <a:bodyPr/>
           <a:lstStyle/>
           <a:p>
-            <a:endParaRPr lang="en-US" dirty="0"/>
+            <a:r>
+              <a:rPr lang="en-US" dirty="0">
+                <a:solidFill>
+                  <a:schemeClr val="tx2"/>
+                </a:solidFill>
+              </a:rPr>
+              <a:t>The decision tree regressor was overfitting but also scored the highest, followed by the random forest and bagging regressor.</a:t>
+            </a:r>
           </a:p>
         </p:txBody>
       </p:sp>
+      <p:pic>
+        <p:nvPicPr>
+          <p:cNvPr id="6" name="Picture 5" descr="Graphical user interface, application&#10;&#10;Description automatically generated">
+            <a:extLst>
+              <a:ext uri="{FF2B5EF4-FFF2-40B4-BE49-F238E27FC236}">
+                <a16:creationId xmlns:a16="http://schemas.microsoft.com/office/drawing/2014/main" id="{EE8360AD-ACAB-E13F-4C9E-14F6F58826F8}"/>
+              </a:ext>
+            </a:extLst>
+          </p:cNvPr>
+          <p:cNvPicPr>
+            <a:picLocks noChangeAspect="1"/>
+          </p:cNvPicPr>
+          <p:nvPr/>
+        </p:nvPicPr>
+        <p:blipFill>
+          <a:blip r:embed="rId2"/>
+          <a:stretch>
+            <a:fillRect/>
+          </a:stretch>
+        </p:blipFill>
+        <p:spPr>
+          <a:xfrm>
+            <a:off x="7721840" y="2070938"/>
+            <a:ext cx="3505689" cy="3286584"/>
+          </a:xfrm>
+          <a:prstGeom prst="rect">
+            <a:avLst/>
+          </a:prstGeom>
+        </p:spPr>
+      </p:pic>
     </p:spTree>
     <p:extLst>
       <p:ext uri="{BB962C8B-B14F-4D97-AF65-F5344CB8AC3E}">
-        <p14:creationId xmlns:p14="http://schemas.microsoft.com/office/powerpoint/2010/main" val="1133016633"/>
+        <p14:creationId xmlns:p14="http://schemas.microsoft.com/office/powerpoint/2010/main" val="2774683180"/>
       </p:ext>
     </p:extLst>
   </p:cSld>
@@ -8443,7 +8516,7 @@
           <p:cNvPr id="2" name="Title 1">
             <a:extLst>
               <a:ext uri="{FF2B5EF4-FFF2-40B4-BE49-F238E27FC236}">
-                <a16:creationId xmlns:a16="http://schemas.microsoft.com/office/drawing/2014/main" id="{CF939169-4C3E-4A48-8916-798010E1EE3D}"/>
+                <a16:creationId xmlns:a16="http://schemas.microsoft.com/office/drawing/2014/main" id="{9C39E3C3-06F2-6BC9-53D0-0EBD963C8322}"/>
               </a:ext>
             </a:extLst>
           </p:cNvPr>
@@ -8460,6 +8533,565 @@
           <a:lstStyle/>
           <a:p>
             <a:r>
+              <a:rPr lang="en-US" dirty="0"/>
+              <a:t>Model Evaluation</a:t>
+            </a:r>
+          </a:p>
+        </p:txBody>
+      </p:sp>
+      <p:sp>
+        <p:nvSpPr>
+          <p:cNvPr id="4" name="Text Placeholder 3">
+            <a:extLst>
+              <a:ext uri="{FF2B5EF4-FFF2-40B4-BE49-F238E27FC236}">
+                <a16:creationId xmlns:a16="http://schemas.microsoft.com/office/drawing/2014/main" id="{7FEBB9E5-8B5F-2268-93FD-56EEEE914340}"/>
+              </a:ext>
+            </a:extLst>
+          </p:cNvPr>
+          <p:cNvSpPr>
+            <a:spLocks noGrp="1"/>
+          </p:cNvSpPr>
+          <p:nvPr>
+            <p:ph type="body" idx="10"/>
+          </p:nvPr>
+        </p:nvSpPr>
+        <p:spPr/>
+        <p:txBody>
+          <a:bodyPr/>
+          <a:lstStyle/>
+          <a:p>
+            <a:r>
+              <a:rPr lang="en-US" dirty="0">
+                <a:solidFill>
+                  <a:schemeClr val="tx2"/>
+                </a:solidFill>
+              </a:rPr>
+              <a:t>Results of </a:t>
+            </a:r>
+            <a:r>
+              <a:rPr lang="en-US" dirty="0" err="1">
+                <a:solidFill>
+                  <a:schemeClr val="tx2"/>
+                </a:solidFill>
+              </a:rPr>
+              <a:t>cross_validation</a:t>
+            </a:r>
+            <a:r>
+              <a:rPr lang="en-US" dirty="0">
+                <a:solidFill>
+                  <a:schemeClr val="tx2"/>
+                </a:solidFill>
+              </a:rPr>
+              <a:t> score on the top three performing models</a:t>
+            </a:r>
+          </a:p>
+        </p:txBody>
+      </p:sp>
+      <p:pic>
+        <p:nvPicPr>
+          <p:cNvPr id="6" name="Picture 5" descr="Text&#10;&#10;Description automatically generated">
+            <a:extLst>
+              <a:ext uri="{FF2B5EF4-FFF2-40B4-BE49-F238E27FC236}">
+                <a16:creationId xmlns:a16="http://schemas.microsoft.com/office/drawing/2014/main" id="{689A9628-D4C8-AD7B-EDD5-D750391DC54D}"/>
+              </a:ext>
+            </a:extLst>
+          </p:cNvPr>
+          <p:cNvPicPr>
+            <a:picLocks noChangeAspect="1"/>
+          </p:cNvPicPr>
+          <p:nvPr/>
+        </p:nvPicPr>
+        <p:blipFill>
+          <a:blip r:embed="rId2"/>
+          <a:stretch>
+            <a:fillRect/>
+          </a:stretch>
+        </p:blipFill>
+        <p:spPr>
+          <a:xfrm>
+            <a:off x="972660" y="3428999"/>
+            <a:ext cx="10305802" cy="1444451"/>
+          </a:xfrm>
+          <a:prstGeom prst="rect">
+            <a:avLst/>
+          </a:prstGeom>
+        </p:spPr>
+      </p:pic>
+    </p:spTree>
+    <p:extLst>
+      <p:ext uri="{BB962C8B-B14F-4D97-AF65-F5344CB8AC3E}">
+        <p14:creationId xmlns:p14="http://schemas.microsoft.com/office/powerpoint/2010/main" val="1133016633"/>
+      </p:ext>
+    </p:extLst>
+  </p:cSld>
+  <p:clrMapOvr>
+    <a:masterClrMapping/>
+  </p:clrMapOvr>
+</p:sld>
+</file>
+
+<file path=ppt/slides/slide16.xml><?xml version="1.0" encoding="utf-8"?>
+<p:sld xmlns:a="http://schemas.openxmlformats.org/drawingml/2006/main" xmlns:r="http://schemas.openxmlformats.org/officeDocument/2006/relationships" xmlns:p="http://schemas.openxmlformats.org/presentationml/2006/main">
+  <p:cSld>
+    <p:spTree>
+      <p:nvGrpSpPr>
+        <p:cNvPr id="1" name=""/>
+        <p:cNvGrpSpPr/>
+        <p:nvPr/>
+      </p:nvGrpSpPr>
+      <p:grpSpPr>
+        <a:xfrm>
+          <a:off x="0" y="0"/>
+          <a:ext cx="0" cy="0"/>
+          <a:chOff x="0" y="0"/>
+          <a:chExt cx="0" cy="0"/>
+        </a:xfrm>
+      </p:grpSpPr>
+      <p:sp>
+        <p:nvSpPr>
+          <p:cNvPr id="2" name="Title 1">
+            <a:extLst>
+              <a:ext uri="{FF2B5EF4-FFF2-40B4-BE49-F238E27FC236}">
+                <a16:creationId xmlns:a16="http://schemas.microsoft.com/office/drawing/2014/main" id="{2F2841C3-5023-008F-B05C-5FCCD8EBC983}"/>
+              </a:ext>
+            </a:extLst>
+          </p:cNvPr>
+          <p:cNvSpPr>
+            <a:spLocks noGrp="1"/>
+          </p:cNvSpPr>
+          <p:nvPr>
+            <p:ph type="title"/>
+          </p:nvPr>
+        </p:nvSpPr>
+        <p:spPr/>
+        <p:txBody>
+          <a:bodyPr/>
+          <a:lstStyle/>
+          <a:p>
+            <a:r>
+              <a:rPr lang="en-US" dirty="0"/>
+              <a:t>Training Validation Scores</a:t>
+            </a:r>
+          </a:p>
+        </p:txBody>
+      </p:sp>
+      <p:pic>
+        <p:nvPicPr>
+          <p:cNvPr id="6" name="Picture 5" descr="Text&#10;&#10;Description automatically generated">
+            <a:extLst>
+              <a:ext uri="{FF2B5EF4-FFF2-40B4-BE49-F238E27FC236}">
+                <a16:creationId xmlns:a16="http://schemas.microsoft.com/office/drawing/2014/main" id="{A60720BB-D887-DB60-621E-C9D0F1C1B32D}"/>
+              </a:ext>
+            </a:extLst>
+          </p:cNvPr>
+          <p:cNvPicPr>
+            <a:picLocks noChangeAspect="1"/>
+          </p:cNvPicPr>
+          <p:nvPr/>
+        </p:nvPicPr>
+        <p:blipFill>
+          <a:blip r:embed="rId2"/>
+          <a:stretch>
+            <a:fillRect/>
+          </a:stretch>
+        </p:blipFill>
+        <p:spPr>
+          <a:xfrm>
+            <a:off x="3183748" y="2099623"/>
+            <a:ext cx="5382376" cy="3924848"/>
+          </a:xfrm>
+          <a:prstGeom prst="rect">
+            <a:avLst/>
+          </a:prstGeom>
+        </p:spPr>
+      </p:pic>
+    </p:spTree>
+    <p:extLst>
+      <p:ext uri="{BB962C8B-B14F-4D97-AF65-F5344CB8AC3E}">
+        <p14:creationId xmlns:p14="http://schemas.microsoft.com/office/powerpoint/2010/main" val="2261819744"/>
+      </p:ext>
+    </p:extLst>
+  </p:cSld>
+  <p:clrMapOvr>
+    <a:masterClrMapping/>
+  </p:clrMapOvr>
+</p:sld>
+</file>
+
+<file path=ppt/slides/slide17.xml><?xml version="1.0" encoding="utf-8"?>
+<p:sld xmlns:a="http://schemas.openxmlformats.org/drawingml/2006/main" xmlns:r="http://schemas.openxmlformats.org/officeDocument/2006/relationships" xmlns:p="http://schemas.openxmlformats.org/presentationml/2006/main">
+  <p:cSld>
+    <p:spTree>
+      <p:nvGrpSpPr>
+        <p:cNvPr id="1" name=""/>
+        <p:cNvGrpSpPr/>
+        <p:nvPr/>
+      </p:nvGrpSpPr>
+      <p:grpSpPr>
+        <a:xfrm>
+          <a:off x="0" y="0"/>
+          <a:ext cx="0" cy="0"/>
+          <a:chOff x="0" y="0"/>
+          <a:chExt cx="0" cy="0"/>
+        </a:xfrm>
+      </p:grpSpPr>
+      <p:sp>
+        <p:nvSpPr>
+          <p:cNvPr id="2" name="Title 1">
+            <a:extLst>
+              <a:ext uri="{FF2B5EF4-FFF2-40B4-BE49-F238E27FC236}">
+                <a16:creationId xmlns:a16="http://schemas.microsoft.com/office/drawing/2014/main" id="{13C4EB2A-C637-822D-0A65-7FE9F46080B3}"/>
+              </a:ext>
+            </a:extLst>
+          </p:cNvPr>
+          <p:cNvSpPr>
+            <a:spLocks noGrp="1"/>
+          </p:cNvSpPr>
+          <p:nvPr>
+            <p:ph type="title"/>
+          </p:nvPr>
+        </p:nvSpPr>
+        <p:spPr/>
+        <p:txBody>
+          <a:bodyPr/>
+          <a:lstStyle/>
+          <a:p>
+            <a:r>
+              <a:rPr lang="en-US" dirty="0"/>
+              <a:t>Final Predictions</a:t>
+            </a:r>
+          </a:p>
+        </p:txBody>
+      </p:sp>
+      <p:sp>
+        <p:nvSpPr>
+          <p:cNvPr id="3" name="Text Placeholder 2">
+            <a:extLst>
+              <a:ext uri="{FF2B5EF4-FFF2-40B4-BE49-F238E27FC236}">
+                <a16:creationId xmlns:a16="http://schemas.microsoft.com/office/drawing/2014/main" id="{F8DECF72-8BE0-20E7-00DD-2754FC35D217}"/>
+              </a:ext>
+            </a:extLst>
+          </p:cNvPr>
+          <p:cNvSpPr>
+            <a:spLocks noGrp="1"/>
+          </p:cNvSpPr>
+          <p:nvPr>
+            <p:ph type="body" idx="1"/>
+          </p:nvPr>
+        </p:nvSpPr>
+        <p:spPr/>
+        <p:txBody>
+          <a:bodyPr/>
+          <a:lstStyle/>
+          <a:p>
+            <a:r>
+              <a:rPr lang="pt-BR" dirty="0">
+                <a:solidFill>
+                  <a:schemeClr val="tx2"/>
+                </a:solidFill>
+              </a:rPr>
+              <a:t>Final Scores:</a:t>
+            </a:r>
+          </a:p>
+          <a:p>
+            <a:r>
+              <a:rPr lang="pt-BR" dirty="0">
+                <a:solidFill>
+                  <a:schemeClr val="tx2"/>
+                </a:solidFill>
+              </a:rPr>
+              <a:t>R2 Score: -0.08</a:t>
+            </a:r>
+          </a:p>
+          <a:p>
+            <a:r>
+              <a:rPr lang="pt-BR" dirty="0">
+                <a:solidFill>
+                  <a:schemeClr val="tx2"/>
+                </a:solidFill>
+              </a:rPr>
+              <a:t>MSE: 267.41</a:t>
+            </a:r>
+          </a:p>
+          <a:p>
+            <a:r>
+              <a:rPr lang="pt-BR" dirty="0">
+                <a:solidFill>
+                  <a:schemeClr val="tx2"/>
+                </a:solidFill>
+              </a:rPr>
+              <a:t>RMSE: 16.35</a:t>
+            </a:r>
+            <a:endParaRPr lang="en-US" dirty="0">
+              <a:solidFill>
+                <a:schemeClr val="tx2"/>
+              </a:solidFill>
+            </a:endParaRPr>
+          </a:p>
+        </p:txBody>
+      </p:sp>
+      <p:sp>
+        <p:nvSpPr>
+          <p:cNvPr id="4" name="Text Placeholder 3">
+            <a:extLst>
+              <a:ext uri="{FF2B5EF4-FFF2-40B4-BE49-F238E27FC236}">
+                <a16:creationId xmlns:a16="http://schemas.microsoft.com/office/drawing/2014/main" id="{5E31A2BD-A4B2-6946-7504-9C7D675E7B36}"/>
+              </a:ext>
+            </a:extLst>
+          </p:cNvPr>
+          <p:cNvSpPr>
+            <a:spLocks noGrp="1"/>
+          </p:cNvSpPr>
+          <p:nvPr>
+            <p:ph type="body" idx="10"/>
+          </p:nvPr>
+        </p:nvSpPr>
+        <p:spPr/>
+        <p:txBody>
+          <a:bodyPr>
+            <a:normAutofit lnSpcReduction="10000"/>
+          </a:bodyPr>
+          <a:lstStyle/>
+          <a:p>
+            <a:r>
+              <a:rPr lang="en-US" dirty="0" err="1">
+                <a:solidFill>
+                  <a:schemeClr val="tx2"/>
+                </a:solidFill>
+              </a:rPr>
+              <a:t>final_predictions</a:t>
+            </a:r>
+            <a:r>
+              <a:rPr lang="en-US" dirty="0">
+                <a:solidFill>
+                  <a:schemeClr val="tx2"/>
+                </a:solidFill>
+              </a:rPr>
+              <a:t> = </a:t>
+            </a:r>
+            <a:r>
+              <a:rPr lang="en-US" dirty="0" err="1">
+                <a:solidFill>
+                  <a:schemeClr val="tx2"/>
+                </a:solidFill>
+              </a:rPr>
+              <a:t>best_model.predict</a:t>
+            </a:r>
+            <a:r>
+              <a:rPr lang="en-US" dirty="0">
+                <a:solidFill>
+                  <a:schemeClr val="tx2"/>
+                </a:solidFill>
+              </a:rPr>
+              <a:t>(</a:t>
+            </a:r>
+            <a:r>
+              <a:rPr lang="en-US" dirty="0" err="1">
+                <a:solidFill>
+                  <a:schemeClr val="tx2"/>
+                </a:solidFill>
+              </a:rPr>
+              <a:t>x_test</a:t>
+            </a:r>
+            <a:r>
+              <a:rPr lang="en-US" dirty="0">
+                <a:solidFill>
+                  <a:schemeClr val="tx2"/>
+                </a:solidFill>
+              </a:rPr>
+              <a:t>)</a:t>
+            </a:r>
+          </a:p>
+          <a:p>
+            <a:r>
+              <a:rPr lang="en-US" dirty="0" err="1">
+                <a:solidFill>
+                  <a:schemeClr val="tx2"/>
+                </a:solidFill>
+              </a:rPr>
+              <a:t>np.around</a:t>
+            </a:r>
+            <a:r>
+              <a:rPr lang="en-US" dirty="0">
+                <a:solidFill>
+                  <a:schemeClr val="tx2"/>
+                </a:solidFill>
+              </a:rPr>
+              <a:t>(</a:t>
+            </a:r>
+            <a:r>
+              <a:rPr lang="en-US" dirty="0" err="1">
+                <a:solidFill>
+                  <a:schemeClr val="tx2"/>
+                </a:solidFill>
+              </a:rPr>
+              <a:t>final_predictions</a:t>
+            </a:r>
+            <a:r>
+              <a:rPr lang="en-US" dirty="0">
+                <a:solidFill>
+                  <a:schemeClr val="tx2"/>
+                </a:solidFill>
+              </a:rPr>
+              <a:t>[:5], 2)</a:t>
+            </a:r>
+          </a:p>
+          <a:p>
+            <a:endParaRPr lang="en-US" dirty="0">
+              <a:solidFill>
+                <a:schemeClr val="tx2"/>
+              </a:solidFill>
+            </a:endParaRPr>
+          </a:p>
+          <a:p>
+            <a:r>
+              <a:rPr lang="en-US" dirty="0">
+                <a:solidFill>
+                  <a:schemeClr val="tx2"/>
+                </a:solidFill>
+              </a:rPr>
+              <a:t>array([22.56, 22.56, 22.56, 22.56, 22.56])</a:t>
+            </a:r>
+          </a:p>
+          <a:p>
+            <a:endParaRPr lang="en-US" dirty="0">
+              <a:solidFill>
+                <a:schemeClr val="tx2"/>
+              </a:solidFill>
+            </a:endParaRPr>
+          </a:p>
+          <a:p>
+            <a:r>
+              <a:rPr lang="en-US" dirty="0">
+                <a:solidFill>
+                  <a:schemeClr val="tx2"/>
+                </a:solidFill>
+              </a:rPr>
+              <a:t># round down</a:t>
+            </a:r>
+          </a:p>
+          <a:p>
+            <a:r>
+              <a:rPr lang="en-US" dirty="0">
+                <a:solidFill>
+                  <a:schemeClr val="tx2"/>
+                </a:solidFill>
+              </a:rPr>
+              <a:t>print("Final Price Prediction: ", </a:t>
+            </a:r>
+            <a:r>
+              <a:rPr lang="en-US" dirty="0" err="1">
+                <a:solidFill>
+                  <a:schemeClr val="tx2"/>
+                </a:solidFill>
+              </a:rPr>
+              <a:t>math.floor</a:t>
+            </a:r>
+            <a:r>
+              <a:rPr lang="en-US" dirty="0">
+                <a:solidFill>
+                  <a:schemeClr val="tx2"/>
+                </a:solidFill>
+              </a:rPr>
+              <a:t>(</a:t>
+            </a:r>
+            <a:r>
+              <a:rPr lang="en-US" dirty="0" err="1">
+                <a:solidFill>
+                  <a:schemeClr val="tx2"/>
+                </a:solidFill>
+              </a:rPr>
+              <a:t>np.mean</a:t>
+            </a:r>
+            <a:r>
+              <a:rPr lang="en-US" dirty="0">
+                <a:solidFill>
+                  <a:schemeClr val="tx2"/>
+                </a:solidFill>
+              </a:rPr>
+              <a:t>(</a:t>
+            </a:r>
+            <a:r>
+              <a:rPr lang="en-US" dirty="0" err="1">
+                <a:solidFill>
+                  <a:schemeClr val="tx2"/>
+                </a:solidFill>
+              </a:rPr>
+              <a:t>final_predictions</a:t>
+            </a:r>
+            <a:r>
+              <a:rPr lang="en-US" dirty="0">
+                <a:solidFill>
+                  <a:schemeClr val="tx2"/>
+                </a:solidFill>
+              </a:rPr>
+              <a:t>)))</a:t>
+            </a:r>
+          </a:p>
+          <a:p>
+            <a:r>
+              <a:rPr lang="en-US" dirty="0">
+                <a:solidFill>
+                  <a:schemeClr val="tx2"/>
+                </a:solidFill>
+              </a:rPr>
+              <a:t>Final Price Prediction:  22</a:t>
+            </a:r>
+          </a:p>
+        </p:txBody>
+      </p:sp>
+    </p:spTree>
+    <p:extLst>
+      <p:ext uri="{BB962C8B-B14F-4D97-AF65-F5344CB8AC3E}">
+        <p14:creationId xmlns:p14="http://schemas.microsoft.com/office/powerpoint/2010/main" val="231588301"/>
+      </p:ext>
+    </p:extLst>
+  </p:cSld>
+  <p:clrMapOvr>
+    <a:masterClrMapping/>
+  </p:clrMapOvr>
+</p:sld>
+</file>
+
+<file path=ppt/slides/slide18.xml><?xml version="1.0" encoding="utf-8"?>
+<p:sld xmlns:a="http://schemas.openxmlformats.org/drawingml/2006/main" xmlns:r="http://schemas.openxmlformats.org/officeDocument/2006/relationships" xmlns:p="http://schemas.openxmlformats.org/presentationml/2006/main">
+  <p:cSld>
+    <p:spTree>
+      <p:nvGrpSpPr>
+        <p:cNvPr id="1" name=""/>
+        <p:cNvGrpSpPr/>
+        <p:nvPr/>
+      </p:nvGrpSpPr>
+      <p:grpSpPr>
+        <a:xfrm>
+          <a:off x="0" y="0"/>
+          <a:ext cx="0" cy="0"/>
+          <a:chOff x="0" y="0"/>
+          <a:chExt cx="0" cy="0"/>
+        </a:xfrm>
+      </p:grpSpPr>
+      <p:sp>
+        <p:nvSpPr>
+          <p:cNvPr id="2" name="Title 1">
+            <a:extLst>
+              <a:ext uri="{FF2B5EF4-FFF2-40B4-BE49-F238E27FC236}">
+                <a16:creationId xmlns:a16="http://schemas.microsoft.com/office/drawing/2014/main" id="{CF939169-4C3E-4A48-8916-798010E1EE3D}"/>
+              </a:ext>
+            </a:extLst>
+          </p:cNvPr>
+          <p:cNvSpPr>
+            <a:spLocks noGrp="1"/>
+          </p:cNvSpPr>
+          <p:nvPr>
+            <p:ph type="title"/>
+          </p:nvPr>
+        </p:nvSpPr>
+        <p:spPr/>
+        <p:txBody>
+          <a:bodyPr/>
+          <a:lstStyle/>
+          <a:p>
+            <a:r>
               <a:rPr lang="en-US" dirty="0">
                 <a:latin typeface="Verdana" panose="020B0604030504040204" pitchFamily="34" charset="0"/>
                 <a:ea typeface="Verdana" panose="020B0604030504040204" pitchFamily="34" charset="0"/>
@@ -8506,7 +9138,7 @@
                 <a:latin typeface="Verdana" panose="020B0604030504040204" pitchFamily="34" charset="0"/>
                 <a:ea typeface="Verdana" panose="020B0604030504040204" pitchFamily="34" charset="0"/>
               </a:rPr>
-              <a:t>Indie game developer Liquid Courage Studios should price their game for xxx on Steam.</a:t>
+              <a:t>Indie game developer Liquid Courage Studios should price their game for $22.00 on Steam.</a:t>
             </a:r>
           </a:p>
         </p:txBody>
@@ -8524,7 +9156,7 @@
 </p:sld>
 </file>
 
-<file path=ppt/slides/slide16.xml><?xml version="1.0" encoding="utf-8"?>
+<file path=ppt/slides/slide19.xml><?xml version="1.0" encoding="utf-8"?>
 <p:sld xmlns:a="http://schemas.openxmlformats.org/drawingml/2006/main" xmlns:r="http://schemas.openxmlformats.org/officeDocument/2006/relationships" xmlns:p="http://schemas.openxmlformats.org/presentationml/2006/main">
   <p:cSld>
     <p:spTree>
@@ -9361,14 +9993,12 @@
                 <a:solidFill>
                   <a:schemeClr val="tx2"/>
                 </a:solidFill>
-                <a:latin typeface="Verdana" panose="020B0604030504040204" pitchFamily="34" charset="0"/>
                 <a:ea typeface="Verdana" panose="020B0604030504040204" pitchFamily="34" charset="0"/>
               </a:rPr>
               <a:t>The dataset comes from Kaggle </a:t>
             </a:r>
             <a:r>
               <a:rPr lang="en-US" dirty="0">
-                <a:latin typeface="Verdana" panose="020B0604030504040204" pitchFamily="34" charset="0"/>
                 <a:ea typeface="Verdana" panose="020B0604030504040204" pitchFamily="34" charset="0"/>
                 <a:hlinkClick r:id="rId2"/>
               </a:rPr>
@@ -9376,7 +10006,6 @@
             </a:r>
             <a:r>
               <a:rPr lang="en-US" dirty="0">
-                <a:latin typeface="Verdana" panose="020B0604030504040204" pitchFamily="34" charset="0"/>
                 <a:ea typeface="Verdana" panose="020B0604030504040204" pitchFamily="34" charset="0"/>
               </a:rPr>
               <a:t> </a:t>
@@ -9391,7 +10020,6 @@
                 <a:solidFill>
                   <a:schemeClr val="tx2"/>
                 </a:solidFill>
-                <a:latin typeface="Verdana" panose="020B0604030504040204" pitchFamily="34" charset="0"/>
                 <a:ea typeface="Verdana" panose="020B0604030504040204" pitchFamily="34" charset="0"/>
               </a:rPr>
               <a:t>The dataset contains 81048 rows and 12 columns. With a mixture of numerical and categorical data including price, name, tagged categories, genre, date of game published, and number of reviews. </a:t>
@@ -9412,7 +10040,6 @@
                   <a:schemeClr val="tx2"/>
                 </a:solidFill>
                 <a:effectLst/>
-                <a:latin typeface="Verdana" panose="020B0604030504040204" pitchFamily="34" charset="0"/>
                 <a:ea typeface="Verdana" panose="020B0604030504040204" pitchFamily="34" charset="0"/>
               </a:rPr>
               <a:t>One very important aspect to keep in mind is the time and price that this data was collected which was two years ago. The metrics and analysis we will perform are from data collected two years ago and will be different that what maybe be currently presented in Steam today. Games could have been removed, sales could have been happening that are no longer available, or the game could be free now. </a:t>
@@ -9485,7 +10112,6 @@
                   <a:schemeClr val="tx2"/>
                 </a:solidFill>
                 <a:effectLst/>
-                <a:latin typeface="Verdana" panose="020B0604030504040204" pitchFamily="34" charset="0"/>
                 <a:ea typeface="Verdana" panose="020B0604030504040204" pitchFamily="34" charset="0"/>
               </a:rPr>
               <a:t>Steam</a:t>
@@ -9496,7 +10122,6 @@
                   <a:schemeClr val="tx2"/>
                 </a:solidFill>
                 <a:effectLst/>
-                <a:latin typeface="Verdana" panose="020B0604030504040204" pitchFamily="34" charset="0"/>
                 <a:ea typeface="Verdana" panose="020B0604030504040204" pitchFamily="34" charset="0"/>
               </a:rPr>
               <a:t> is a widely popular video game distribution platform. Currently there are over 50,000 different games available for purchase. It was launched as a software client in September 2003 as a way for Valve to provide automatic updates for their games and expanded to distributing and offering third-party game publishers' titles in late 2005. Steam unit sales data is not publicly available, but we can use the number of reviews as an estimated guess of how many units were sold.</a:t>
@@ -9645,7 +10270,6 @@
                   <a:schemeClr val="tx2"/>
                 </a:solidFill>
                 <a:effectLst/>
-                <a:latin typeface="Verdana" panose="020B0604030504040204" pitchFamily="34" charset="0"/>
                 <a:ea typeface="Verdana" panose="020B0604030504040204" pitchFamily="34" charset="0"/>
               </a:rPr>
               <a:t>Steam sales data is not publicly available, but we can use the number of reviews as a good estimate for units sold this is called the </a:t>
@@ -9656,7 +10280,6 @@
                   <a:schemeClr val="tx2"/>
                 </a:solidFill>
                 <a:effectLst/>
-                <a:latin typeface="Verdana" panose="020B0604030504040204" pitchFamily="34" charset="0"/>
                 <a:ea typeface="Verdana" panose="020B0604030504040204" pitchFamily="34" charset="0"/>
               </a:rPr>
               <a:t>Boxleiter</a:t>
@@ -9667,7 +10290,6 @@
                   <a:schemeClr val="tx2"/>
                 </a:solidFill>
                 <a:effectLst/>
-                <a:latin typeface="Verdana" panose="020B0604030504040204" pitchFamily="34" charset="0"/>
                 <a:ea typeface="Verdana" panose="020B0604030504040204" pitchFamily="34" charset="0"/>
               </a:rPr>
               <a:t> or New </a:t>
@@ -9678,7 +10300,6 @@
                   <a:schemeClr val="tx2"/>
                 </a:solidFill>
                 <a:effectLst/>
-                <a:latin typeface="Verdana" panose="020B0604030504040204" pitchFamily="34" charset="0"/>
                 <a:ea typeface="Verdana" panose="020B0604030504040204" pitchFamily="34" charset="0"/>
               </a:rPr>
               <a:t>Boxleiter</a:t>
@@ -9689,7 +10310,6 @@
                   <a:schemeClr val="tx2"/>
                 </a:solidFill>
                 <a:effectLst/>
-                <a:latin typeface="Verdana" panose="020B0604030504040204" pitchFamily="34" charset="0"/>
                 <a:ea typeface="Verdana" panose="020B0604030504040204" pitchFamily="34" charset="0"/>
               </a:rPr>
               <a:t> number method, estimating the number of Steam game unit sold based on the number of reviews they got.</a:t>
@@ -9705,10 +10325,20 @@
                   <a:schemeClr val="tx2"/>
                 </a:solidFill>
                 <a:effectLst/>
-                <a:latin typeface="Verdana" panose="020B0604030504040204" pitchFamily="34" charset="0"/>
+                <a:ea typeface="Verdana" panose="020B0604030504040204" pitchFamily="34" charset="0"/>
+                <a:hlinkClick r:id="rId2"/>
+              </a:rPr>
+              <a:t>https://vginsights.com/insights/article/how-to-estimate-steam-video-game-sales</a:t>
+            </a:r>
+            <a:r>
+              <a:rPr lang="en-US" b="0" dirty="0">
+                <a:solidFill>
+                  <a:schemeClr val="tx2"/>
+                </a:solidFill>
+                <a:effectLst/>
                 <a:ea typeface="Verdana" panose="020B0604030504040204" pitchFamily="34" charset="0"/>
               </a:rPr>
-              <a:t>https://vginsights.com/insights/article/how-to-estimate-steam-video-game-sales </a:t>
+              <a:t>  </a:t>
             </a:r>
           </a:p>
           <a:p>
@@ -9718,10 +10348,20 @@
                   <a:schemeClr val="tx2"/>
                 </a:solidFill>
                 <a:effectLst/>
-                <a:latin typeface="Verdana" panose="020B0604030504040204" pitchFamily="34" charset="0"/>
+                <a:ea typeface="Verdana" panose="020B0604030504040204" pitchFamily="34" charset="0"/>
+                <a:hlinkClick r:id="rId3"/>
+              </a:rPr>
+              <a:t>https://newsletter.gamediscover.co/p/how-that-game-sold-on-steam-using</a:t>
+            </a:r>
+            <a:r>
+              <a:rPr lang="en-US" b="0" dirty="0">
+                <a:solidFill>
+                  <a:schemeClr val="tx2"/>
+                </a:solidFill>
+                <a:effectLst/>
                 <a:ea typeface="Verdana" panose="020B0604030504040204" pitchFamily="34" charset="0"/>
               </a:rPr>
-              <a:t>https://newsletter.gamediscover.co/p/how-that-game-sold-on-steam-using</a:t>
+              <a:t> </a:t>
             </a:r>
           </a:p>
           <a:p>
@@ -9826,7 +10466,6 @@
                 <a:solidFill>
                   <a:schemeClr val="tx2"/>
                 </a:solidFill>
-                <a:latin typeface="Verdana" panose="020B0604030504040204" pitchFamily="34" charset="0"/>
                 <a:ea typeface="Verdana" panose="020B0604030504040204" pitchFamily="34" charset="0"/>
               </a:rPr>
               <a:t>Input</a:t>
@@ -9842,7 +10481,6 @@
                 <a:solidFill>
                   <a:schemeClr val="tx2"/>
                 </a:solidFill>
-                <a:latin typeface="Verdana" panose="020B0604030504040204" pitchFamily="34" charset="0"/>
                 <a:ea typeface="Verdana" panose="020B0604030504040204" pitchFamily="34" charset="0"/>
               </a:rPr>
               <a:t>Datetime stamp, developer, publisher, description of game, popular tags, game name, id of game, price of game, number of recent user reviews, total number of all reviews,  predicted number of units sold per video game based on the scaling factor.</a:t>
@@ -10093,7 +10731,6 @@
                 <a:solidFill>
                   <a:schemeClr val="tx2"/>
                 </a:solidFill>
-                <a:latin typeface="Verdana" panose="020B0604030504040204" pitchFamily="34" charset="0"/>
                 <a:ea typeface="Verdana" panose="020B0604030504040204" pitchFamily="34" charset="0"/>
               </a:rPr>
               <a:t>Output</a:t>
@@ -10109,7 +10746,6 @@
                 <a:solidFill>
                   <a:schemeClr val="tx2"/>
                 </a:solidFill>
-                <a:latin typeface="Verdana" panose="020B0604030504040204" pitchFamily="34" charset="0"/>
                 <a:ea typeface="Verdana" panose="020B0604030504040204" pitchFamily="34" charset="0"/>
               </a:rPr>
               <a:t>The predicted price of a video game on steam</a:t>
@@ -10125,7 +10761,6 @@
                 <a:solidFill>
                   <a:schemeClr val="tx2"/>
                 </a:solidFill>
-                <a:latin typeface="Verdana" panose="020B0604030504040204" pitchFamily="34" charset="0"/>
                 <a:ea typeface="Verdana" panose="020B0604030504040204" pitchFamily="34" charset="0"/>
               </a:rPr>
               <a:t>a predicted single discrete value of how much money in USD should the indie game developer sell their video game for on Steam. </a:t>
@@ -10200,7 +10835,6 @@
                 <a:solidFill>
                   <a:schemeClr val="tx2"/>
                 </a:solidFill>
-                <a:latin typeface="Verdana" panose="020B0604030504040204" pitchFamily="34" charset="0"/>
                 <a:ea typeface="Verdana" panose="020B0604030504040204" pitchFamily="34" charset="0"/>
               </a:rPr>
               <a:t>Overwhelmingly Positive(151,281)- 96% of the 151,281 user reviews in the last 30 days are positive.</a:t>
@@ -10216,7 +10850,6 @@
                 <a:solidFill>
                   <a:schemeClr val="tx2"/>
                 </a:solidFill>
-                <a:latin typeface="Verdana" panose="020B0604030504040204" pitchFamily="34" charset="0"/>
                 <a:ea typeface="Verdana" panose="020B0604030504040204" pitchFamily="34" charset="0"/>
               </a:rPr>
               <a:t>Overwhelmingly Positive(224,878)- 95% of the 224,878 user reviews for this game are positive.</a:t>
@@ -10232,7 +10865,6 @@
                 <a:solidFill>
                   <a:schemeClr val="tx2"/>
                 </a:solidFill>
-                <a:latin typeface="Verdana" panose="020B0604030504040204" pitchFamily="34" charset="0"/>
                 <a:ea typeface="Verdana" panose="020B0604030504040204" pitchFamily="34" charset="0"/>
               </a:rPr>
               <a:t>*used regex for most of this</a:t>
@@ -10272,7 +10904,6 @@
                 <a:solidFill>
                   <a:schemeClr val="tx2"/>
                 </a:solidFill>
-                <a:latin typeface="Verdana" panose="020B0604030504040204" pitchFamily="34" charset="0"/>
                 <a:ea typeface="Verdana" panose="020B0604030504040204" pitchFamily="34" charset="0"/>
               </a:rPr>
               <a:t>Extract </a:t>
@@ -10282,7 +10913,6 @@
                 <a:solidFill>
                   <a:schemeClr val="tx2"/>
                 </a:solidFill>
-                <a:latin typeface="Verdana" panose="020B0604030504040204" pitchFamily="34" charset="0"/>
                 <a:ea typeface="Verdana" panose="020B0604030504040204" pitchFamily="34" charset="0"/>
               </a:rPr>
               <a:t>uuid</a:t>
@@ -10292,7 +10922,6 @@
                 <a:solidFill>
                   <a:schemeClr val="tx2"/>
                 </a:solidFill>
-                <a:latin typeface="Verdana" panose="020B0604030504040204" pitchFamily="34" charset="0"/>
                 <a:ea typeface="Verdana" panose="020B0604030504040204" pitchFamily="34" charset="0"/>
               </a:rPr>
               <a:t> from </a:t>
@@ -10302,7 +10931,6 @@
                 <a:solidFill>
                   <a:schemeClr val="tx2"/>
                 </a:solidFill>
-                <a:latin typeface="Verdana" panose="020B0604030504040204" pitchFamily="34" charset="0"/>
                 <a:ea typeface="Verdana" panose="020B0604030504040204" pitchFamily="34" charset="0"/>
               </a:rPr>
               <a:t>url</a:t>
@@ -10312,7 +10940,6 @@
                 <a:solidFill>
                   <a:schemeClr val="tx2"/>
                 </a:solidFill>
-                <a:latin typeface="Verdana" panose="020B0604030504040204" pitchFamily="34" charset="0"/>
                 <a:ea typeface="Verdana" panose="020B0604030504040204" pitchFamily="34" charset="0"/>
               </a:rPr>
               <a:t> in link</a:t>
@@ -10328,7 +10955,6 @@
                 <a:solidFill>
                   <a:schemeClr val="tx2"/>
                 </a:solidFill>
-                <a:latin typeface="Verdana" panose="020B0604030504040204" pitchFamily="34" charset="0"/>
                 <a:ea typeface="Verdana" panose="020B0604030504040204" pitchFamily="34" charset="0"/>
               </a:rPr>
               <a:t>Extract the number of reviews from both review columns </a:t>
@@ -10344,7 +10970,6 @@
                 <a:solidFill>
                   <a:schemeClr val="tx2"/>
                 </a:solidFill>
-                <a:latin typeface="Verdana" panose="020B0604030504040204" pitchFamily="34" charset="0"/>
                 <a:ea typeface="Verdana" panose="020B0604030504040204" pitchFamily="34" charset="0"/>
               </a:rPr>
               <a:t>Extract the price</a:t>
@@ -10360,7 +10985,6 @@
                 <a:solidFill>
                   <a:schemeClr val="tx2"/>
                 </a:solidFill>
-                <a:latin typeface="Verdana" panose="020B0604030504040204" pitchFamily="34" charset="0"/>
                 <a:ea typeface="Verdana" panose="020B0604030504040204" pitchFamily="34" charset="0"/>
               </a:rPr>
               <a:t>Clean up datetime stamp</a:t>
@@ -10389,7 +11013,6 @@
                 <a:solidFill>
                   <a:schemeClr val="tx2"/>
                 </a:solidFill>
-                <a:latin typeface="Verdana" panose="020B0604030504040204" pitchFamily="34" charset="0"/>
                 <a:ea typeface="Verdana" panose="020B0604030504040204" pitchFamily="34" charset="0"/>
               </a:rPr>
               <a:t>Nov 16, 2018 </a:t>
@@ -10405,7 +11028,6 @@
                 <a:solidFill>
                   <a:schemeClr val="tx2"/>
                 </a:solidFill>
-                <a:latin typeface="Verdana" panose="020B0604030504040204" pitchFamily="34" charset="0"/>
                 <a:ea typeface="Verdana" panose="020B0604030504040204" pitchFamily="34" charset="0"/>
               </a:rPr>
               <a:t>Buy Among Us$4.99Add to Cart</a:t>
@@ -10535,7 +11157,6 @@
                   <a:schemeClr val="tx2"/>
                 </a:solidFill>
                 <a:effectLst/>
-                <a:latin typeface="Verdana" panose="020B0604030504040204" pitchFamily="34" charset="0"/>
                 <a:ea typeface="Verdana" panose="020B0604030504040204" pitchFamily="34" charset="0"/>
               </a:rPr>
               <a:t>What is the average price of a steam game?</a:t>
@@ -10548,7 +11169,6 @@
                   <a:schemeClr val="tx2"/>
                 </a:solidFill>
                 <a:effectLst/>
-                <a:latin typeface="Verdana" panose="020B0604030504040204" pitchFamily="34" charset="0"/>
                 <a:ea typeface="Verdana" panose="020B0604030504040204" pitchFamily="34" charset="0"/>
               </a:rPr>
               <a:t>10.99</a:t>
@@ -10559,7 +11179,6 @@
               <a:solidFill>
                 <a:schemeClr val="tx2"/>
               </a:solidFill>
-              <a:latin typeface="Verdana" panose="020B0604030504040204" pitchFamily="34" charset="0"/>
               <a:ea typeface="Verdana" panose="020B0604030504040204" pitchFamily="34" charset="0"/>
             </a:endParaRPr>
           </a:p>
@@ -10570,7 +11189,6 @@
                   <a:schemeClr val="tx2"/>
                 </a:solidFill>
                 <a:effectLst/>
-                <a:latin typeface="Verdana" panose="020B0604030504040204" pitchFamily="34" charset="0"/>
                 <a:ea typeface="Verdana" panose="020B0604030504040204" pitchFamily="34" charset="0"/>
               </a:rPr>
               <a:t>Average price without free to play games?</a:t>
@@ -10583,7 +11201,6 @@
                   <a:schemeClr val="tx2"/>
                 </a:solidFill>
                 <a:effectLst/>
-                <a:latin typeface="Verdana" panose="020B0604030504040204" pitchFamily="34" charset="0"/>
                 <a:ea typeface="Verdana" panose="020B0604030504040204" pitchFamily="34" charset="0"/>
               </a:rPr>
               <a:t>11.16</a:t>
@@ -10594,7 +11211,6 @@
               <a:solidFill>
                 <a:srgbClr val="D4D4D4"/>
               </a:solidFill>
-              <a:latin typeface="Consolas" panose="020B0609020204030204" pitchFamily="49" charset="0"/>
             </a:endParaRPr>
           </a:p>
           <a:p>

</xml_diff>